<commit_message>
Update gitbook 2021-12-08 16:39:56
</commit_message>
<xml_diff>
--- a/DatabasesReplit/DatabasesOverview.pptx
+++ b/DatabasesReplit/DatabasesOverview.pptx
@@ -218,7 +218,7 @@
           <a:p>
             <a:fld id="{19104133-B5B0-4351-8158-4F0E5EB1E2BF}" type="datetimeFigureOut">
               <a:rPr lang="en-US" smtClean="0"/>
-              <a:t>1/26/2021</a:t>
+              <a:t>12/6/2021</a:t>
             </a:fld>
             <a:endParaRPr lang="en-US"/>
           </a:p>
@@ -1116,7 +1116,7 @@
             </a:pPr>
             <a:r>
               <a:rPr lang="en-US" i="0" dirty="0"/>
-              <a:t>If the students do not know, tell them that Key and Peele was a sketch comedy show from the 2010s.</a:t>
+              <a:t>If the students do not know, tell them that Key and Peele was a sketch comedy show from the 2010s. https://www.youtube.com/watch?v=rT1nGjGM2p8</a:t>
             </a:r>
           </a:p>
           <a:p>
@@ -2119,7 +2119,7 @@
             <a:fld id="{1C2D31DE-C454-491C-B5C3-F097855E3DF7}" type="datetime4">
               <a:rPr lang="en-US" smtClean="0"/>
               <a:pPr/>
-              <a:t>January 26, 2021</a:t>
+              <a:t>December 6, 2021</a:t>
             </a:fld>
             <a:endParaRPr lang="en-US" dirty="0"/>
           </a:p>
@@ -5511,7 +5511,7 @@
           <a:p>
             <a:fld id="{5958763E-B898-436D-883D-03711491D54A}" type="datetimeFigureOut">
               <a:rPr lang="en-US" smtClean="0"/>
-              <a:t>1/26/2021</a:t>
+              <a:t>12/6/2021</a:t>
             </a:fld>
             <a:endParaRPr lang="en-US"/>
           </a:p>
@@ -5704,7 +5704,7 @@
           <a:p>
             <a:fld id="{5958763E-B898-436D-883D-03711491D54A}" type="datetimeFigureOut">
               <a:rPr lang="en-US" smtClean="0"/>
-              <a:t>1/26/2021</a:t>
+              <a:t>12/6/2021</a:t>
             </a:fld>
             <a:endParaRPr lang="en-US"/>
           </a:p>
@@ -5954,7 +5954,7 @@
           <a:p>
             <a:fld id="{5958763E-B898-436D-883D-03711491D54A}" type="datetimeFigureOut">
               <a:rPr lang="en-US" smtClean="0"/>
-              <a:t>1/26/2021</a:t>
+              <a:t>12/6/2021</a:t>
             </a:fld>
             <a:endParaRPr lang="en-US"/>
           </a:p>
@@ -6302,7 +6302,7 @@
           <a:p>
             <a:fld id="{5958763E-B898-436D-883D-03711491D54A}" type="datetimeFigureOut">
               <a:rPr lang="en-US" smtClean="0"/>
-              <a:t>1/26/2021</a:t>
+              <a:t>12/6/2021</a:t>
             </a:fld>
             <a:endParaRPr lang="en-US"/>
           </a:p>
@@ -6718,7 +6718,7 @@
           <a:p>
             <a:fld id="{5958763E-B898-436D-883D-03711491D54A}" type="datetimeFigureOut">
               <a:rPr lang="en-US" smtClean="0"/>
-              <a:t>1/26/2021</a:t>
+              <a:t>12/6/2021</a:t>
             </a:fld>
             <a:endParaRPr lang="en-US"/>
           </a:p>
@@ -7219,7 +7219,7 @@
           <a:p>
             <a:fld id="{5958763E-B898-436D-883D-03711491D54A}" type="datetimeFigureOut">
               <a:rPr lang="en-US" smtClean="0"/>
-              <a:t>1/26/2021</a:t>
+              <a:t>12/6/2021</a:t>
             </a:fld>
             <a:endParaRPr lang="en-US"/>
           </a:p>
@@ -7670,7 +7670,7 @@
           <a:p>
             <a:fld id="{5958763E-B898-436D-883D-03711491D54A}" type="datetimeFigureOut">
               <a:rPr lang="en-US" smtClean="0"/>
-              <a:t>1/26/2021</a:t>
+              <a:t>12/6/2021</a:t>
             </a:fld>
             <a:endParaRPr lang="en-US"/>
           </a:p>
@@ -8281,7 +8281,7 @@
           <a:p>
             <a:fld id="{5958763E-B898-436D-883D-03711491D54A}" type="datetimeFigureOut">
               <a:rPr lang="en-US" smtClean="0"/>
-              <a:t>1/26/2021</a:t>
+              <a:t>12/6/2021</a:t>
             </a:fld>
             <a:endParaRPr lang="en-US"/>
           </a:p>
@@ -9052,7 +9052,7 @@
           <a:p>
             <a:fld id="{5958763E-B898-436D-883D-03711491D54A}" type="datetimeFigureOut">
               <a:rPr lang="en-US" smtClean="0"/>
-              <a:t>1/26/2021</a:t>
+              <a:t>12/6/2021</a:t>
             </a:fld>
             <a:endParaRPr lang="en-US"/>
           </a:p>
@@ -9156,7 +9156,7 @@
           <a:p>
             <a:fld id="{5958763E-B898-436D-883D-03711491D54A}" type="datetimeFigureOut">
               <a:rPr lang="en-US" smtClean="0"/>
-              <a:t>1/26/2021</a:t>
+              <a:t>12/6/2021</a:t>
             </a:fld>
             <a:endParaRPr lang="en-US"/>
           </a:p>
@@ -9483,7 +9483,7 @@
             <a:fld id="{1C2D31DE-C454-491C-B5C3-F097855E3DF7}" type="datetime4">
               <a:rPr lang="en-US" smtClean="0"/>
               <a:pPr/>
-              <a:t>January 26, 2021</a:t>
+              <a:t>December 6, 2021</a:t>
             </a:fld>
             <a:endParaRPr lang="en-US" dirty="0"/>
           </a:p>
@@ -12635,7 +12635,7 @@
           <a:p>
             <a:fld id="{5958763E-B898-436D-883D-03711491D54A}" type="datetimeFigureOut">
               <a:rPr lang="en-US" smtClean="0"/>
-              <a:t>1/26/2021</a:t>
+              <a:t>12/6/2021</a:t>
             </a:fld>
             <a:endParaRPr lang="en-US"/>
           </a:p>
@@ -12759,7 +12759,7 @@
           <a:p>
             <a:fld id="{5958763E-B898-436D-883D-03711491D54A}" type="datetimeFigureOut">
               <a:rPr lang="en-US" smtClean="0"/>
-              <a:t>1/26/2021</a:t>
+              <a:t>12/6/2021</a:t>
             </a:fld>
             <a:endParaRPr lang="en-US"/>
           </a:p>
@@ -12883,7 +12883,7 @@
           <a:p>
             <a:fld id="{5958763E-B898-436D-883D-03711491D54A}" type="datetimeFigureOut">
               <a:rPr lang="en-US" smtClean="0"/>
-              <a:t>1/26/2021</a:t>
+              <a:t>12/6/2021</a:t>
             </a:fld>
             <a:endParaRPr lang="en-US"/>
           </a:p>
@@ -13007,7 +13007,7 @@
           <a:p>
             <a:fld id="{5958763E-B898-436D-883D-03711491D54A}" type="datetimeFigureOut">
               <a:rPr lang="en-US" smtClean="0"/>
-              <a:t>1/26/2021</a:t>
+              <a:t>12/6/2021</a:t>
             </a:fld>
             <a:endParaRPr lang="en-US"/>
           </a:p>
@@ -13131,7 +13131,7 @@
           <a:p>
             <a:fld id="{5958763E-B898-436D-883D-03711491D54A}" type="datetimeFigureOut">
               <a:rPr lang="en-US" smtClean="0"/>
-              <a:t>1/26/2021</a:t>
+              <a:t>12/6/2021</a:t>
             </a:fld>
             <a:endParaRPr lang="en-US"/>
           </a:p>
@@ -13255,7 +13255,7 @@
           <a:p>
             <a:fld id="{5958763E-B898-436D-883D-03711491D54A}" type="datetimeFigureOut">
               <a:rPr lang="en-US" smtClean="0"/>
-              <a:t>1/26/2021</a:t>
+              <a:t>12/6/2021</a:t>
             </a:fld>
             <a:endParaRPr lang="en-US"/>
           </a:p>
@@ -13379,7 +13379,7 @@
           <a:p>
             <a:fld id="{5958763E-B898-436D-883D-03711491D54A}" type="datetimeFigureOut">
               <a:rPr lang="en-US" smtClean="0"/>
-              <a:t>1/26/2021</a:t>
+              <a:t>12/6/2021</a:t>
             </a:fld>
             <a:endParaRPr lang="en-US"/>
           </a:p>
@@ -13503,7 +13503,7 @@
           <a:p>
             <a:fld id="{5958763E-B898-436D-883D-03711491D54A}" type="datetimeFigureOut">
               <a:rPr lang="en-US" smtClean="0"/>
-              <a:t>1/26/2021</a:t>
+              <a:t>12/6/2021</a:t>
             </a:fld>
             <a:endParaRPr lang="en-US"/>
           </a:p>
@@ -13636,7 +13636,7 @@
           <a:p>
             <a:fld id="{5958763E-B898-436D-883D-03711491D54A}" type="datetimeFigureOut">
               <a:rPr lang="en-US" smtClean="0"/>
-              <a:t>1/26/2021</a:t>
+              <a:t>12/6/2021</a:t>
             </a:fld>
             <a:endParaRPr lang="en-US"/>
           </a:p>
@@ -16975,7 +16975,7 @@
             <a:fld id="{1C2D31DE-C454-491C-B5C3-F097855E3DF7}" type="datetime4">
               <a:rPr lang="en-US" smtClean="0"/>
               <a:pPr/>
-              <a:t>January 26, 2021</a:t>
+              <a:t>December 6, 2021</a:t>
             </a:fld>
             <a:endParaRPr lang="en-US" dirty="0"/>
           </a:p>
@@ -29211,7 +29211,7 @@
           <a:p>
             <a:fld id="{5958763E-B898-436D-883D-03711491D54A}" type="datetimeFigureOut">
               <a:rPr lang="en-US" smtClean="0"/>
-              <a:t>1/26/2021</a:t>
+              <a:t>12/6/2021</a:t>
             </a:fld>
             <a:endParaRPr lang="en-US"/>
           </a:p>
@@ -29613,7 +29613,7 @@
           <a:p>
             <a:fld id="{5958763E-B898-436D-883D-03711491D54A}" type="datetimeFigureOut">
               <a:rPr lang="en-US" smtClean="0"/>
-              <a:t>1/26/2021</a:t>
+              <a:t>12/6/2021</a:t>
             </a:fld>
             <a:endParaRPr lang="en-US"/>
           </a:p>
@@ -29907,7 +29907,7 @@
           <a:p>
             <a:fld id="{5958763E-B898-436D-883D-03711491D54A}" type="datetimeFigureOut">
               <a:rPr lang="en-US" smtClean="0"/>
-              <a:t>1/26/2021</a:t>
+              <a:t>12/6/2021</a:t>
             </a:fld>
             <a:endParaRPr lang="en-US"/>
           </a:p>
@@ -30108,7 +30108,7 @@
           <a:p>
             <a:fld id="{5958763E-B898-436D-883D-03711491D54A}" type="datetimeFigureOut">
               <a:rPr lang="en-US" smtClean="0"/>
-              <a:t>1/26/2021</a:t>
+              <a:t>12/6/2021</a:t>
             </a:fld>
             <a:endParaRPr lang="en-US"/>
           </a:p>
@@ -30369,7 +30369,7 @@
           <a:p>
             <a:fld id="{5958763E-B898-436D-883D-03711491D54A}" type="datetimeFigureOut">
               <a:rPr lang="en-US" smtClean="0"/>
-              <a:t>1/26/2021</a:t>
+              <a:t>12/6/2021</a:t>
             </a:fld>
             <a:endParaRPr lang="en-US"/>
           </a:p>
@@ -30877,7 +30877,7 @@
           <a:p>
             <a:fld id="{5958763E-B898-436D-883D-03711491D54A}" type="datetimeFigureOut">
               <a:rPr lang="en-US" smtClean="0"/>
-              <a:t>1/26/2021</a:t>
+              <a:t>12/6/2021</a:t>
             </a:fld>
             <a:endParaRPr lang="en-US"/>
           </a:p>
@@ -31356,7 +31356,7 @@
           <a:p>
             <a:fld id="{5958763E-B898-436D-883D-03711491D54A}" type="datetimeFigureOut">
               <a:rPr lang="en-US" smtClean="0"/>
-              <a:t>1/26/2021</a:t>
+              <a:t>12/6/2021</a:t>
             </a:fld>
             <a:endParaRPr lang="en-US"/>
           </a:p>
@@ -32175,7 +32175,7 @@
           <a:p>
             <a:fld id="{5958763E-B898-436D-883D-03711491D54A}" type="datetimeFigureOut">
               <a:rPr lang="en-US" smtClean="0"/>
-              <a:t>1/26/2021</a:t>
+              <a:t>12/6/2021</a:t>
             </a:fld>
             <a:endParaRPr lang="en-US"/>
           </a:p>
@@ -32376,7 +32376,7 @@
           <a:p>
             <a:fld id="{5958763E-B898-436D-883D-03711491D54A}" type="datetimeFigureOut">
               <a:rPr lang="en-US" smtClean="0"/>
-              <a:t>1/26/2021</a:t>
+              <a:t>12/6/2021</a:t>
             </a:fld>
             <a:endParaRPr lang="en-US"/>
           </a:p>
@@ -32711,7 +32711,7 @@
           <a:p>
             <a:fld id="{5958763E-B898-436D-883D-03711491D54A}" type="datetimeFigureOut">
               <a:rPr lang="en-US" smtClean="0"/>
-              <a:t>1/26/2021</a:t>
+              <a:t>12/6/2021</a:t>
             </a:fld>
             <a:endParaRPr lang="en-US"/>
           </a:p>
@@ -32941,7 +32941,7 @@
           <a:p>
             <a:fld id="{5958763E-B898-436D-883D-03711491D54A}" type="datetimeFigureOut">
               <a:rPr lang="en-US" smtClean="0"/>
-              <a:t>1/26/2021</a:t>
+              <a:t>12/6/2021</a:t>
             </a:fld>
             <a:endParaRPr lang="en-US"/>
           </a:p>
@@ -33185,7 +33185,7 @@
           <a:p>
             <a:fld id="{5958763E-B898-436D-883D-03711491D54A}" type="datetimeFigureOut">
               <a:rPr lang="en-US" smtClean="0"/>
-              <a:t>1/26/2021</a:t>
+              <a:t>12/6/2021</a:t>
             </a:fld>
             <a:endParaRPr lang="en-US"/>
           </a:p>
@@ -39663,12 +39663,20 @@
               </a:spcAft>
             </a:pPr>
             <a:r>
+              <a:rPr lang="en-US" b="1" dirty="0" err="1">
+                <a:solidFill>
+                  <a:srgbClr val="000000"/>
+                </a:solidFill>
+              </a:rPr>
+              <a:t>Replit</a:t>
+            </a:r>
+            <a:r>
               <a:rPr lang="en-US" b="1" dirty="0">
                 <a:solidFill>
                   <a:srgbClr val="000000"/>
                 </a:solidFill>
               </a:rPr>
-              <a:t>Repl.it DB</a:t>
+              <a:t> DB</a:t>
             </a:r>
           </a:p>
           <a:p>
@@ -41158,15 +41166,6 @@
           <a:solidFill>
             <a:srgbClr val="FFFFFF"/>
           </a:solidFill>
-          <a:extLst>
-            <a:ext uri="{909E8E84-426E-40DD-AFC4-6F175D3DCCD1}">
-              <a14:hiddenFill xmlns:a14="http://schemas.microsoft.com/office/drawing/2010/main">
-                <a:solidFill>
-                  <a:srgbClr val="FFFFFF"/>
-                </a:solidFill>
-              </a14:hiddenFill>
-            </a:ext>
-          </a:extLst>
         </p:spPr>
       </p:pic>
       <p:sp>
@@ -42164,8 +42163,12 @@
           <a:lstStyle/>
           <a:p>
             <a:r>
+              <a:rPr lang="en-US" dirty="0" err="1"/>
+              <a:t>Replit</a:t>
+            </a:r>
+            <a:r>
               <a:rPr lang="en-US" dirty="0"/>
-              <a:t>Repl.it DB – A Persistent key-value store</a:t>
+              <a:t> DB – A Persistent key-value store</a:t>
             </a:r>
           </a:p>
         </p:txBody>
@@ -45282,7 +45285,15 @@
           <a:p>
             <a:r>
               <a:rPr lang="en-US" dirty="0"/>
-              <a:t>Interacting with The Repl.it DB in Node.js</a:t>
+              <a:t>Interacting with The </a:t>
+            </a:r>
+            <a:r>
+              <a:rPr lang="en-US" dirty="0" err="1"/>
+              <a:t>Replit</a:t>
+            </a:r>
+            <a:r>
+              <a:rPr lang="en-US" dirty="0"/>
+              <a:t> DB in Node.js</a:t>
             </a:r>
           </a:p>
         </p:txBody>

</xml_diff>